<commit_message>
Added syntax for Python 2
</commit_message>
<xml_diff>
--- a/Grunt.pptx
+++ b/Grunt.pptx
@@ -345,7 +345,7 @@
           <a:p>
             <a:fld id="{4BDF68E2-58F2-4D09-BE8B-E3BD06533059}" type="datetimeFigureOut">
               <a:rPr lang="en-US" dirty="0"/>
-              <a:t>5/15/2014</a:t>
+              <a:t>5/22/2014</a:t>
             </a:fld>
             <a:endParaRPr lang="en-US" dirty="0"/>
           </a:p>
@@ -548,7 +548,7 @@
           <a:p>
             <a:fld id="{2E2D6473-DF6D-4702-B328-E0DD40540A4E}" type="datetimeFigureOut">
               <a:rPr lang="en-US" dirty="0"/>
-              <a:t>5/15/2014</a:t>
+              <a:t>5/22/2014</a:t>
             </a:fld>
             <a:endParaRPr lang="en-US" dirty="0"/>
           </a:p>
@@ -799,7 +799,7 @@
           <a:p>
             <a:fld id="{E26F7E3A-B166-407D-9866-32884E7D5B37}" type="datetimeFigureOut">
               <a:rPr lang="en-US" dirty="0"/>
-              <a:t>5/15/2014</a:t>
+              <a:t>5/22/2014</a:t>
             </a:fld>
             <a:endParaRPr lang="en-US" dirty="0"/>
           </a:p>
@@ -968,7 +968,7 @@
           <a:p>
             <a:fld id="{528FC5F6-F338-4AE4-BB23-26385BCFC423}" type="datetimeFigureOut">
               <a:rPr lang="en-US" dirty="0"/>
-              <a:t>5/15/2014</a:t>
+              <a:t>5/22/2014</a:t>
             </a:fld>
             <a:endParaRPr lang="en-US" dirty="0"/>
           </a:p>
@@ -1306,7 +1306,7 @@
           <a:p>
             <a:fld id="{20EBB0C4-6273-4C6E-B9BD-2EDC30F1CD52}" type="datetimeFigureOut">
               <a:rPr lang="en-US" dirty="0"/>
-              <a:t>5/15/2014</a:t>
+              <a:t>5/22/2014</a:t>
             </a:fld>
             <a:endParaRPr lang="en-US" dirty="0"/>
           </a:p>
@@ -1576,7 +1576,7 @@
           <a:p>
             <a:fld id="{19AB4D41-86C1-4908-B66A-0B50CEB3BF29}" type="datetimeFigureOut">
               <a:rPr lang="en-US" dirty="0"/>
-              <a:t>5/15/2014</a:t>
+              <a:t>5/22/2014</a:t>
             </a:fld>
             <a:endParaRPr lang="en-US" dirty="0"/>
           </a:p>
@@ -1950,7 +1950,7 @@
           <a:p>
             <a:fld id="{E6426E2C-56C1-4E0D-A793-0088A7FDD37E}" type="datetimeFigureOut">
               <a:rPr lang="en-US" dirty="0"/>
-              <a:t>5/15/2014</a:t>
+              <a:t>5/22/2014</a:t>
             </a:fld>
             <a:endParaRPr lang="en-US" dirty="0"/>
           </a:p>
@@ -2063,7 +2063,7 @@
           <a:p>
             <a:fld id="{C8C39B41-D8B5-4052-B551-9B5525EAA8B6}" type="datetimeFigureOut">
               <a:rPr lang="en-US" dirty="0"/>
-              <a:t>5/15/2014</a:t>
+              <a:t>5/22/2014</a:t>
             </a:fld>
             <a:endParaRPr lang="en-US" dirty="0"/>
           </a:p>
@@ -2229,7 +2229,7 @@
           <a:p>
             <a:fld id="{4D94136C-8742-45B2-AF27-D93DF72833A9}" type="datetimeFigureOut">
               <a:rPr lang="en-US" dirty="0"/>
-              <a:t>5/15/2014</a:t>
+              <a:t>5/22/2014</a:t>
             </a:fld>
             <a:endParaRPr lang="en-US" dirty="0"/>
           </a:p>
@@ -2579,7 +2579,7 @@
           <a:p>
             <a:fld id="{32ABBEA6-7C60-4B02-AE87-00D78D8422AF}" type="datetimeFigureOut">
               <a:rPr lang="en-US" dirty="0"/>
-              <a:t>5/15/2014</a:t>
+              <a:t>5/22/2014</a:t>
             </a:fld>
             <a:endParaRPr lang="en-US" dirty="0"/>
           </a:p>
@@ -2957,7 +2957,7 @@
           <a:p>
             <a:fld id="{C9CAD897-D46E-4AD2-BD9B-49DD3E640873}" type="datetimeFigureOut">
               <a:rPr lang="en-US" dirty="0"/>
-              <a:t>5/15/2014</a:t>
+              <a:t>5/22/2014</a:t>
             </a:fld>
             <a:endParaRPr lang="en-US" dirty="0"/>
           </a:p>
@@ -3239,7 +3239,7 @@
           <a:p>
             <a:fld id="{98624D31-43A5-475A-80CF-332C9F6DCF35}" type="datetimeFigureOut">
               <a:rPr lang="en-US" dirty="0"/>
-              <a:t>5/15/2014</a:t>
+              <a:t>5/22/2014</a:t>
             </a:fld>
             <a:endParaRPr lang="en-US" dirty="0"/>
           </a:p>
@@ -3832,6 +3832,13 @@
   <p:clrMapOvr>
     <a:masterClrMapping/>
   </p:clrMapOvr>
+  <p:timing>
+    <p:tnLst>
+      <p:par>
+        <p:cTn id="1" dur="indefinite" restart="never" nodeType="tmRoot"/>
+      </p:par>
+    </p:tnLst>
+  </p:timing>
 </p:sld>
 </file>
 
@@ -4071,6 +4078,13 @@
   <p:clrMapOvr>
     <a:masterClrMapping/>
   </p:clrMapOvr>
+  <p:timing>
+    <p:tnLst>
+      <p:par>
+        <p:cTn id="1" dur="indefinite" restart="never" nodeType="tmRoot"/>
+      </p:par>
+    </p:tnLst>
+  </p:timing>
 </p:sld>
 </file>
 
@@ -4236,7 +4250,6 @@
               <a:rPr lang="sv-SE" dirty="0" smtClean="0"/>
               <a:t> </a:t>
             </a:r>
-            <a:endParaRPr lang="sv-SE" dirty="0" smtClean="0"/>
           </a:p>
           <a:p>
             <a:r>
@@ -4305,6 +4318,13 @@
   <p:clrMapOvr>
     <a:masterClrMapping/>
   </p:clrMapOvr>
+  <p:timing>
+    <p:tnLst>
+      <p:par>
+        <p:cTn id="1" dur="indefinite" restart="never" nodeType="tmRoot"/>
+      </p:par>
+    </p:tnLst>
+  </p:timing>
 </p:sld>
 </file>
 
@@ -4391,11 +4411,7 @@
             </a:r>
             <a:r>
               <a:rPr lang="sv-SE" dirty="0" smtClean="0"/>
-              <a:t> </a:t>
-            </a:r>
-            <a:r>
-              <a:rPr lang="sv-SE" dirty="0" smtClean="0"/>
-              <a:t>tests, </a:t>
+              <a:t> tests, </a:t>
             </a:r>
             <a:r>
               <a:rPr lang="sv-SE" dirty="0" err="1" smtClean="0"/>
@@ -4488,13 +4504,8 @@
             </a:r>
             <a:r>
               <a:rPr lang="sv-SE" dirty="0" smtClean="0"/>
-              <a:t> </a:t>
-            </a:r>
-            <a:r>
-              <a:rPr lang="sv-SE" dirty="0" smtClean="0"/>
-              <a:t>Jasmine and Karma</a:t>
-            </a:r>
-            <a:endParaRPr lang="sv-SE" dirty="0" smtClean="0"/>
+              <a:t> Jasmine and Karma</a:t>
+            </a:r>
           </a:p>
           <a:p>
             <a:r>
@@ -4601,6 +4612,13 @@
   <p:clrMapOvr>
     <a:masterClrMapping/>
   </p:clrMapOvr>
+  <p:timing>
+    <p:tnLst>
+      <p:par>
+        <p:cTn id="1" dur="indefinite" restart="never" nodeType="tmRoot"/>
+      </p:par>
+    </p:tnLst>
+  </p:timing>
 </p:sld>
 </file>
 
@@ -4896,6 +4914,13 @@
   <p:clrMapOvr>
     <a:masterClrMapping/>
   </p:clrMapOvr>
+  <p:timing>
+    <p:tnLst>
+      <p:par>
+        <p:cTn id="1" dur="indefinite" restart="never" nodeType="tmRoot"/>
+      </p:par>
+    </p:tnLst>
+  </p:timing>
 </p:sld>
 </file>
 
@@ -5086,6 +5111,13 @@
   <p:clrMapOvr>
     <a:masterClrMapping/>
   </p:clrMapOvr>
+  <p:timing>
+    <p:tnLst>
+      <p:par>
+        <p:cTn id="1" dur="indefinite" restart="never" nodeType="tmRoot"/>
+      </p:par>
+    </p:tnLst>
+  </p:timing>
 </p:sld>
 </file>
 
@@ -5180,8 +5212,43 @@
               <a:rPr lang="sv-SE" dirty="0" smtClean="0"/>
               <a:t>: </a:t>
             </a:r>
-          </a:p>
-          <a:p>
+            <a:endParaRPr lang="sv-SE" dirty="0" smtClean="0"/>
+          </a:p>
+          <a:p>
+            <a:r>
+              <a:rPr lang="sv-SE" dirty="0" err="1" smtClean="0"/>
+              <a:t>Python</a:t>
+            </a:r>
+            <a:r>
+              <a:rPr lang="sv-SE" dirty="0" smtClean="0"/>
+              <a:t> 2:</a:t>
+            </a:r>
+            <a:endParaRPr lang="sv-SE" dirty="0"/>
+          </a:p>
+          <a:p>
+            <a:r>
+              <a:rPr lang="sv-SE" dirty="0" err="1" smtClean="0"/>
+              <a:t>python</a:t>
+            </a:r>
+            <a:r>
+              <a:rPr lang="sv-SE" dirty="0" smtClean="0"/>
+              <a:t> –m </a:t>
+            </a:r>
+            <a:r>
+              <a:rPr lang="sv-SE" dirty="0" err="1" smtClean="0"/>
+              <a:t>simplehttpserver</a:t>
+            </a:r>
+            <a:endParaRPr lang="sv-SE" dirty="0" smtClean="0"/>
+          </a:p>
+          <a:p>
+            <a:r>
+              <a:rPr lang="sv-SE" dirty="0" err="1" smtClean="0"/>
+              <a:t>Python</a:t>
+            </a:r>
+            <a:r>
+              <a:rPr lang="sv-SE" dirty="0" smtClean="0"/>
+              <a:t> 3:</a:t>
+            </a:r>
             <a:endParaRPr lang="sv-SE" dirty="0"/>
           </a:p>
           <a:p>
@@ -5214,6 +5281,13 @@
   <p:clrMapOvr>
     <a:masterClrMapping/>
   </p:clrMapOvr>
+  <p:timing>
+    <p:tnLst>
+      <p:par>
+        <p:cTn id="1" dur="indefinite" restart="never" nodeType="tmRoot"/>
+      </p:par>
+    </p:tnLst>
+  </p:timing>
 </p:sld>
 </file>
 
@@ -5394,6 +5468,13 @@
   <p:clrMapOvr>
     <a:masterClrMapping/>
   </p:clrMapOvr>
+  <p:timing>
+    <p:tnLst>
+      <p:par>
+        <p:cTn id="1" dur="indefinite" restart="never" nodeType="tmRoot"/>
+      </p:par>
+    </p:tnLst>
+  </p:timing>
 </p:sld>
 </file>
 

</xml_diff>

<commit_message>
Corrected Contactenation -> Concatenation
</commit_message>
<xml_diff>
--- a/Grunt.pptx
+++ b/Grunt.pptx
@@ -345,7 +345,7 @@
           <a:p>
             <a:fld id="{4BDF68E2-58F2-4D09-BE8B-E3BD06533059}" type="datetimeFigureOut">
               <a:rPr lang="en-US" dirty="0"/>
-              <a:t>5/22/2014</a:t>
+              <a:t>5/23/2014</a:t>
             </a:fld>
             <a:endParaRPr lang="en-US" dirty="0"/>
           </a:p>
@@ -548,7 +548,7 @@
           <a:p>
             <a:fld id="{2E2D6473-DF6D-4702-B328-E0DD40540A4E}" type="datetimeFigureOut">
               <a:rPr lang="en-US" dirty="0"/>
-              <a:t>5/22/2014</a:t>
+              <a:t>5/23/2014</a:t>
             </a:fld>
             <a:endParaRPr lang="en-US" dirty="0"/>
           </a:p>
@@ -799,7 +799,7 @@
           <a:p>
             <a:fld id="{E26F7E3A-B166-407D-9866-32884E7D5B37}" type="datetimeFigureOut">
               <a:rPr lang="en-US" dirty="0"/>
-              <a:t>5/22/2014</a:t>
+              <a:t>5/23/2014</a:t>
             </a:fld>
             <a:endParaRPr lang="en-US" dirty="0"/>
           </a:p>
@@ -968,7 +968,7 @@
           <a:p>
             <a:fld id="{528FC5F6-F338-4AE4-BB23-26385BCFC423}" type="datetimeFigureOut">
               <a:rPr lang="en-US" dirty="0"/>
-              <a:t>5/22/2014</a:t>
+              <a:t>5/23/2014</a:t>
             </a:fld>
             <a:endParaRPr lang="en-US" dirty="0"/>
           </a:p>
@@ -1306,7 +1306,7 @@
           <a:p>
             <a:fld id="{20EBB0C4-6273-4C6E-B9BD-2EDC30F1CD52}" type="datetimeFigureOut">
               <a:rPr lang="en-US" dirty="0"/>
-              <a:t>5/22/2014</a:t>
+              <a:t>5/23/2014</a:t>
             </a:fld>
             <a:endParaRPr lang="en-US" dirty="0"/>
           </a:p>
@@ -1576,7 +1576,7 @@
           <a:p>
             <a:fld id="{19AB4D41-86C1-4908-B66A-0B50CEB3BF29}" type="datetimeFigureOut">
               <a:rPr lang="en-US" dirty="0"/>
-              <a:t>5/22/2014</a:t>
+              <a:t>5/23/2014</a:t>
             </a:fld>
             <a:endParaRPr lang="en-US" dirty="0"/>
           </a:p>
@@ -1950,7 +1950,7 @@
           <a:p>
             <a:fld id="{E6426E2C-56C1-4E0D-A793-0088A7FDD37E}" type="datetimeFigureOut">
               <a:rPr lang="en-US" dirty="0"/>
-              <a:t>5/22/2014</a:t>
+              <a:t>5/23/2014</a:t>
             </a:fld>
             <a:endParaRPr lang="en-US" dirty="0"/>
           </a:p>
@@ -2063,7 +2063,7 @@
           <a:p>
             <a:fld id="{C8C39B41-D8B5-4052-B551-9B5525EAA8B6}" type="datetimeFigureOut">
               <a:rPr lang="en-US" dirty="0"/>
-              <a:t>5/22/2014</a:t>
+              <a:t>5/23/2014</a:t>
             </a:fld>
             <a:endParaRPr lang="en-US" dirty="0"/>
           </a:p>
@@ -2229,7 +2229,7 @@
           <a:p>
             <a:fld id="{4D94136C-8742-45B2-AF27-D93DF72833A9}" type="datetimeFigureOut">
               <a:rPr lang="en-US" dirty="0"/>
-              <a:t>5/22/2014</a:t>
+              <a:t>5/23/2014</a:t>
             </a:fld>
             <a:endParaRPr lang="en-US" dirty="0"/>
           </a:p>
@@ -2579,7 +2579,7 @@
           <a:p>
             <a:fld id="{32ABBEA6-7C60-4B02-AE87-00D78D8422AF}" type="datetimeFigureOut">
               <a:rPr lang="en-US" dirty="0"/>
-              <a:t>5/22/2014</a:t>
+              <a:t>5/23/2014</a:t>
             </a:fld>
             <a:endParaRPr lang="en-US" dirty="0"/>
           </a:p>
@@ -2957,7 +2957,7 @@
           <a:p>
             <a:fld id="{C9CAD897-D46E-4AD2-BD9B-49DD3E640873}" type="datetimeFigureOut">
               <a:rPr lang="en-US" dirty="0"/>
-              <a:t>5/22/2014</a:t>
+              <a:t>5/23/2014</a:t>
             </a:fld>
             <a:endParaRPr lang="en-US" dirty="0"/>
           </a:p>
@@ -3239,7 +3239,7 @@
           <a:p>
             <a:fld id="{98624D31-43A5-475A-80CF-332C9F6DCF35}" type="datetimeFigureOut">
               <a:rPr lang="en-US" dirty="0"/>
-              <a:t>5/22/2014</a:t>
+              <a:t>5/23/2014</a:t>
             </a:fld>
             <a:endParaRPr lang="en-US" dirty="0"/>
           </a:p>
@@ -4430,8 +4430,8 @@
               <a:t>, </a:t>
             </a:r>
             <a:r>
-              <a:rPr lang="sv-SE" dirty="0" err="1" smtClean="0"/>
-              <a:t>contatenation</a:t>
+              <a:rPr lang="sv-SE" smtClean="0"/>
+              <a:t>concatenation</a:t>
             </a:r>
             <a:r>
               <a:rPr lang="sv-SE" dirty="0" smtClean="0"/>
@@ -5212,7 +5212,6 @@
               <a:rPr lang="sv-SE" dirty="0" smtClean="0"/>
               <a:t>: </a:t>
             </a:r>
-            <a:endParaRPr lang="sv-SE" dirty="0" smtClean="0"/>
           </a:p>
           <a:p>
             <a:r>

</xml_diff>